<commit_message>
adição do ultimo slide na apresentação
</commit_message>
<xml_diff>
--- a/Impactos da Entrega Contínua em.pptx
+++ b/Impactos da Entrega Contínua em.pptx
@@ -14,6 +14,7 @@
     <p:sldId id="262" r:id="rId8"/>
     <p:sldId id="263" r:id="rId9"/>
     <p:sldId id="264" r:id="rId10"/>
+    <p:sldId id="265" r:id="rId11"/>
   </p:sldIdLst>
   <p:sldSz cx="12192000" cy="6858000"/>
   <p:notesSz cx="6858000" cy="9144000"/>
@@ -112,6 +113,11 @@
       </a:defRPr>
     </a:lvl9pPr>
   </p:defaultTextStyle>
+  <p:extLst>
+    <p:ext uri="{EFAFB233-063F-42B5-8137-9DF3F51BA10A}">
+      <p15:sldGuideLst xmlns:p15="http://schemas.microsoft.com/office/powerpoint/2012/main"/>
+    </p:ext>
+  </p:extLst>
 </p:presentation>
 </file>
 
@@ -8908,7 +8914,7 @@
           <a:p>
             <a:fld id="{211E24E7-E7CF-4EBE-8607-4431269B7A12}" type="datetimeFigureOut">
               <a:rPr lang="pt-BR" smtClean="0"/>
-              <a:t>27/06/2021</a:t>
+              <a:t>28/06/2021</a:t>
             </a:fld>
             <a:endParaRPr lang="pt-BR"/>
           </a:p>
@@ -9115,7 +9121,7 @@
           <a:p>
             <a:fld id="{211E24E7-E7CF-4EBE-8607-4431269B7A12}" type="datetimeFigureOut">
               <a:rPr lang="pt-BR" smtClean="0"/>
-              <a:t>27/06/2021</a:t>
+              <a:t>28/06/2021</a:t>
             </a:fld>
             <a:endParaRPr lang="pt-BR"/>
           </a:p>
@@ -9295,7 +9301,7 @@
           <a:p>
             <a:fld id="{211E24E7-E7CF-4EBE-8607-4431269B7A12}" type="datetimeFigureOut">
               <a:rPr lang="pt-BR" smtClean="0"/>
-              <a:t>27/06/2021</a:t>
+              <a:t>28/06/2021</a:t>
             </a:fld>
             <a:endParaRPr lang="pt-BR"/>
           </a:p>
@@ -9500,7 +9506,7 @@
           <a:p>
             <a:fld id="{211E24E7-E7CF-4EBE-8607-4431269B7A12}" type="datetimeFigureOut">
               <a:rPr lang="pt-BR" smtClean="0"/>
-              <a:t>27/06/2021</a:t>
+              <a:t>28/06/2021</a:t>
             </a:fld>
             <a:endParaRPr lang="pt-BR"/>
           </a:p>
@@ -18398,7 +18404,7 @@
           <a:p>
             <a:fld id="{211E24E7-E7CF-4EBE-8607-4431269B7A12}" type="datetimeFigureOut">
               <a:rPr lang="pt-BR" smtClean="0"/>
-              <a:t>27/06/2021</a:t>
+              <a:t>28/06/2021</a:t>
             </a:fld>
             <a:endParaRPr lang="pt-BR"/>
           </a:p>
@@ -18672,7 +18678,7 @@
           <a:p>
             <a:fld id="{211E24E7-E7CF-4EBE-8607-4431269B7A12}" type="datetimeFigureOut">
               <a:rPr lang="pt-BR" smtClean="0"/>
-              <a:t>27/06/2021</a:t>
+              <a:t>28/06/2021</a:t>
             </a:fld>
             <a:endParaRPr lang="pt-BR"/>
           </a:p>
@@ -19070,7 +19076,7 @@
           <a:p>
             <a:fld id="{211E24E7-E7CF-4EBE-8607-4431269B7A12}" type="datetimeFigureOut">
               <a:rPr lang="pt-BR" smtClean="0"/>
-              <a:t>27/06/2021</a:t>
+              <a:t>28/06/2021</a:t>
             </a:fld>
             <a:endParaRPr lang="pt-BR"/>
           </a:p>
@@ -19188,7 +19194,7 @@
           <a:p>
             <a:fld id="{211E24E7-E7CF-4EBE-8607-4431269B7A12}" type="datetimeFigureOut">
               <a:rPr lang="pt-BR" smtClean="0"/>
-              <a:t>27/06/2021</a:t>
+              <a:t>28/06/2021</a:t>
             </a:fld>
             <a:endParaRPr lang="pt-BR"/>
           </a:p>
@@ -19283,7 +19289,7 @@
           <a:p>
             <a:fld id="{211E24E7-E7CF-4EBE-8607-4431269B7A12}" type="datetimeFigureOut">
               <a:rPr lang="pt-BR" smtClean="0"/>
-              <a:t>27/06/2021</a:t>
+              <a:t>28/06/2021</a:t>
             </a:fld>
             <a:endParaRPr lang="pt-BR"/>
           </a:p>
@@ -19573,7 +19579,7 @@
           <a:p>
             <a:fld id="{211E24E7-E7CF-4EBE-8607-4431269B7A12}" type="datetimeFigureOut">
               <a:rPr lang="pt-BR" smtClean="0"/>
-              <a:t>27/06/2021</a:t>
+              <a:t>28/06/2021</a:t>
             </a:fld>
             <a:endParaRPr lang="pt-BR"/>
           </a:p>
@@ -19853,7 +19859,7 @@
           <a:p>
             <a:fld id="{211E24E7-E7CF-4EBE-8607-4431269B7A12}" type="datetimeFigureOut">
               <a:rPr lang="pt-BR" smtClean="0"/>
-              <a:t>27/06/2021</a:t>
+              <a:t>28/06/2021</a:t>
             </a:fld>
             <a:endParaRPr lang="pt-BR"/>
           </a:p>
@@ -20103,7 +20109,7 @@
           <a:p>
             <a:fld id="{211E24E7-E7CF-4EBE-8607-4431269B7A12}" type="datetimeFigureOut">
               <a:rPr lang="pt-BR" smtClean="0"/>
-              <a:t>27/06/2021</a:t>
+              <a:t>28/06/2021</a:t>
             </a:fld>
             <a:endParaRPr lang="pt-BR"/>
           </a:p>
@@ -20674,6 +20680,111 @@
     <p:extLst>
       <p:ext uri="{BB962C8B-B14F-4D97-AF65-F5344CB8AC3E}">
         <p14:creationId xmlns:p14="http://schemas.microsoft.com/office/powerpoint/2010/main" val="3078053937"/>
+      </p:ext>
+    </p:extLst>
+  </p:cSld>
+  <p:clrMapOvr>
+    <a:masterClrMapping/>
+  </p:clrMapOvr>
+</p:sld>
+</file>
+
+<file path=ppt/slides/slide10.xml><?xml version="1.0" encoding="utf-8"?>
+<p:sld xmlns:a="http://schemas.openxmlformats.org/drawingml/2006/main" xmlns:r="http://schemas.openxmlformats.org/officeDocument/2006/relationships" xmlns:p="http://schemas.openxmlformats.org/presentationml/2006/main">
+  <p:cSld>
+    <p:spTree>
+      <p:nvGrpSpPr>
+        <p:cNvPr id="1" name=""/>
+        <p:cNvGrpSpPr/>
+        <p:nvPr/>
+      </p:nvGrpSpPr>
+      <p:grpSpPr>
+        <a:xfrm>
+          <a:off x="0" y="0"/>
+          <a:ext cx="0" cy="0"/>
+          <a:chOff x="0" y="0"/>
+          <a:chExt cx="0" cy="0"/>
+        </a:xfrm>
+      </p:grpSpPr>
+      <p:sp>
+        <p:nvSpPr>
+          <p:cNvPr id="2" name="Título 1">
+            <a:extLst>
+              <a:ext uri="{FF2B5EF4-FFF2-40B4-BE49-F238E27FC236}">
+                <a16:creationId xmlns:a16="http://schemas.microsoft.com/office/drawing/2014/main" id="{DD05F032-BA25-4103-89D3-3845D1D8F3AF}"/>
+              </a:ext>
+            </a:extLst>
+          </p:cNvPr>
+          <p:cNvSpPr>
+            <a:spLocks noGrp="1"/>
+          </p:cNvSpPr>
+          <p:nvPr>
+            <p:ph type="title"/>
+          </p:nvPr>
+        </p:nvSpPr>
+        <p:spPr/>
+        <p:txBody>
+          <a:bodyPr/>
+          <a:lstStyle/>
+          <a:p>
+            <a:r>
+              <a:rPr lang="pt-BR" dirty="0"/>
+              <a:t>Trabalhos Futuros</a:t>
+            </a:r>
+          </a:p>
+        </p:txBody>
+      </p:sp>
+      <p:sp>
+        <p:nvSpPr>
+          <p:cNvPr id="3" name="Espaço Reservado para Conteúdo 2">
+            <a:extLst>
+              <a:ext uri="{FF2B5EF4-FFF2-40B4-BE49-F238E27FC236}">
+                <a16:creationId xmlns:a16="http://schemas.microsoft.com/office/drawing/2014/main" id="{55955FBF-9B79-4276-9602-9186B92C3292}"/>
+              </a:ext>
+            </a:extLst>
+          </p:cNvPr>
+          <p:cNvSpPr>
+            <a:spLocks noGrp="1"/>
+          </p:cNvSpPr>
+          <p:nvPr>
+            <p:ph idx="1"/>
+          </p:nvPr>
+        </p:nvSpPr>
+        <p:spPr/>
+        <p:txBody>
+          <a:bodyPr/>
+          <a:lstStyle/>
+          <a:p>
+            <a:pPr marL="457200" indent="-457200">
+              <a:buFont typeface="+mj-lt"/>
+              <a:buAutoNum type="arabicPeriod"/>
+            </a:pPr>
+            <a:r>
+              <a:rPr lang="pt-BR" dirty="0"/>
+              <a:t>Realizar uma análise e visualizações dos dados encontrados para as perguntas iniciais </a:t>
+            </a:r>
+          </a:p>
+          <a:p>
+            <a:pPr marL="457200" indent="-457200">
+              <a:buFont typeface="+mj-lt"/>
+              <a:buAutoNum type="arabicPeriod"/>
+            </a:pPr>
+            <a:r>
+              <a:rPr lang="pt-BR" dirty="0"/>
+              <a:t>Criar um modelo preditivo do crescimento do projeto e das suas características a partir do </a:t>
+            </a:r>
+            <a:r>
+              <a:rPr lang="pt-BR"/>
+              <a:t>seu histórico </a:t>
+            </a:r>
+            <a:endParaRPr lang="pt-BR" dirty="0"/>
+          </a:p>
+        </p:txBody>
+      </p:sp>
+    </p:spTree>
+    <p:extLst>
+      <p:ext uri="{BB962C8B-B14F-4D97-AF65-F5344CB8AC3E}">
+        <p14:creationId xmlns:p14="http://schemas.microsoft.com/office/powerpoint/2010/main" val="3315651622"/>
       </p:ext>
     </p:extLst>
   </p:cSld>
@@ -21946,6 +22057,16 @@
               <a:buFont typeface="+mj-lt"/>
               <a:buAutoNum type="arabicPeriod"/>
             </a:pPr>
+            <a:r>
+              <a:rPr lang="pt-BR" dirty="0"/>
+              <a:t>Validei comparando os resultados com a busca da versão web</a:t>
+            </a:r>
+          </a:p>
+          <a:p>
+            <a:pPr marL="457200" indent="-457200">
+              <a:buFont typeface="+mj-lt"/>
+              <a:buAutoNum type="arabicPeriod"/>
+            </a:pPr>
             <a:endParaRPr lang="pt-BR" dirty="0"/>
           </a:p>
           <a:p>

</xml_diff>